<commit_message>
Added Why swift to pres
</commit_message>
<xml_diff>
--- a/SwiftPresentation.pptx
+++ b/SwiftPresentation.pptx
@@ -9,6 +9,8 @@
     <p:sldId id="258" r:id="rId3"/>
     <p:sldId id="257" r:id="rId4"/>
     <p:sldId id="259" r:id="rId5"/>
+    <p:sldId id="261" r:id="rId6"/>
+    <p:sldId id="260" r:id="rId7"/>
   </p:sldIdLst>
   <p:sldSz cx="12192000" cy="6858000"/>
   <p:notesSz cx="6858000" cy="9144000"/>
@@ -107,6 +109,11 @@
       </a:defRPr>
     </a:lvl9pPr>
   </p:defaultTextStyle>
+  <p:extLst>
+    <p:ext uri="{EFAFB233-063F-42B5-8137-9DF3F51BA10A}">
+      <p15:sldGuideLst xmlns:p15="http://schemas.microsoft.com/office/powerpoint/2012/main"/>
+    </p:ext>
+  </p:extLst>
 </p:presentation>
 </file>
 
@@ -6722,6 +6729,347 @@
 </p:sld>
 </file>
 
+<file path=ppt/slides/slide5.xml><?xml version="1.0" encoding="utf-8"?>
+<p:sld xmlns:a="http://schemas.openxmlformats.org/drawingml/2006/main" xmlns:r="http://schemas.openxmlformats.org/officeDocument/2006/relationships" xmlns:p="http://schemas.openxmlformats.org/presentationml/2006/main">
+  <p:cSld>
+    <p:spTree>
+      <p:nvGrpSpPr>
+        <p:cNvPr id="1" name=""/>
+        <p:cNvGrpSpPr/>
+        <p:nvPr/>
+      </p:nvGrpSpPr>
+      <p:grpSpPr>
+        <a:xfrm>
+          <a:off x="0" y="0"/>
+          <a:ext cx="0" cy="0"/>
+          <a:chOff x="0" y="0"/>
+          <a:chExt cx="0" cy="0"/>
+        </a:xfrm>
+      </p:grpSpPr>
+      <p:sp>
+        <p:nvSpPr>
+          <p:cNvPr id="2" name="Title 1"/>
+          <p:cNvSpPr>
+            <a:spLocks noGrp="1"/>
+          </p:cNvSpPr>
+          <p:nvPr>
+            <p:ph type="title"/>
+          </p:nvPr>
+        </p:nvSpPr>
+        <p:spPr/>
+        <p:txBody>
+          <a:bodyPr/>
+          <a:lstStyle/>
+          <a:p>
+            <a:r>
+              <a:rPr lang="en-US" dirty="0" smtClean="0"/>
+              <a:t>Why Swift?</a:t>
+            </a:r>
+            <a:endParaRPr lang="en-US" dirty="0"/>
+          </a:p>
+        </p:txBody>
+      </p:sp>
+      <p:sp>
+        <p:nvSpPr>
+          <p:cNvPr id="3" name="Content Placeholder 2"/>
+          <p:cNvSpPr>
+            <a:spLocks noGrp="1"/>
+          </p:cNvSpPr>
+          <p:nvPr>
+            <p:ph idx="1"/>
+          </p:nvPr>
+        </p:nvSpPr>
+        <p:spPr>
+          <a:xfrm>
+            <a:off x="781050" y="1314450"/>
+            <a:ext cx="9268803" cy="4933949"/>
+          </a:xfrm>
+        </p:spPr>
+        <p:txBody>
+          <a:bodyPr>
+            <a:normAutofit lnSpcReduction="10000"/>
+          </a:bodyPr>
+          <a:lstStyle/>
+          <a:p>
+            <a:pPr lvl="1"/>
+            <a:r>
+              <a:rPr lang="en-US" sz="1600" dirty="0" smtClean="0"/>
+              <a:t>One language to work across all Apple platforms and interoperable with all Apple frameworks. And Swift is free, its open-source with strong back-up from Apple.   Apple provides complete toolchain </a:t>
+            </a:r>
+            <a:r>
+              <a:rPr lang="en-US" sz="1600" dirty="0" smtClean="0"/>
+              <a:t>with IDE for free.</a:t>
+            </a:r>
+            <a:r>
+              <a:rPr lang="en-US" sz="1600" dirty="0" smtClean="0"/>
+              <a:t> </a:t>
+            </a:r>
+          </a:p>
+          <a:p>
+            <a:pPr lvl="1"/>
+            <a:r>
+              <a:rPr lang="en-US" sz="1600" dirty="0" smtClean="0"/>
+              <a:t>Easier to learn, teach and develop</a:t>
+            </a:r>
+          </a:p>
+          <a:p>
+            <a:pPr lvl="2"/>
+            <a:r>
+              <a:rPr lang="en-US" sz="1400" dirty="0" smtClean="0"/>
+              <a:t>One of the main design objective of Swift </a:t>
+            </a:r>
+            <a:r>
+              <a:rPr lang="en-US" sz="1400" dirty="0" smtClean="0"/>
+              <a:t>was </a:t>
+            </a:r>
+            <a:r>
+              <a:rPr lang="en-US" sz="1400" dirty="0" smtClean="0"/>
+              <a:t>to remove the complexity.</a:t>
+            </a:r>
+          </a:p>
+          <a:p>
+            <a:pPr lvl="2"/>
+            <a:r>
+              <a:rPr lang="en-US" sz="1400" dirty="0" smtClean="0"/>
+              <a:t>Picked the main features used by the most popular languages.</a:t>
+            </a:r>
+            <a:endParaRPr lang="en-US" sz="1400" dirty="0" smtClean="0"/>
+          </a:p>
+          <a:p>
+            <a:pPr lvl="1"/>
+            <a:r>
+              <a:rPr lang="en-US" sz="1600" dirty="0" smtClean="0"/>
+              <a:t>Inspired by and includes </a:t>
+            </a:r>
+            <a:r>
+              <a:rPr lang="en-US" sz="1600" dirty="0" smtClean="0"/>
+              <a:t>lots of good features from other popular languages, some interesting Swift features are mentioned below</a:t>
+            </a:r>
+          </a:p>
+          <a:p>
+            <a:pPr lvl="2"/>
+            <a:r>
+              <a:rPr lang="en-US" sz="1400" dirty="0" smtClean="0"/>
+              <a:t>Generics – Like templates in C++, Java</a:t>
+            </a:r>
+          </a:p>
+          <a:p>
+            <a:pPr lvl="3"/>
+            <a:r>
+              <a:rPr lang="en-US" sz="1200" dirty="0" smtClean="0"/>
+              <a:t>E.g. - </a:t>
+            </a:r>
+            <a:r>
+              <a:rPr lang="fr-FR" sz="1200" dirty="0" err="1"/>
+              <a:t>func</a:t>
+            </a:r>
+            <a:r>
+              <a:rPr lang="fr-FR" sz="1200" dirty="0"/>
+              <a:t> </a:t>
+            </a:r>
+            <a:r>
+              <a:rPr lang="fr-FR" sz="1200" dirty="0" err="1"/>
+              <a:t>swapTwoValues</a:t>
+            </a:r>
+            <a:r>
+              <a:rPr lang="fr-FR" sz="1200" dirty="0"/>
+              <a:t>&lt;T&gt;(</a:t>
+            </a:r>
+            <a:r>
+              <a:rPr lang="fr-FR" sz="1200" dirty="0" err="1"/>
+              <a:t>inout</a:t>
+            </a:r>
+            <a:r>
+              <a:rPr lang="fr-FR" sz="1200" dirty="0"/>
+              <a:t> a: T, </a:t>
+            </a:r>
+            <a:r>
+              <a:rPr lang="fr-FR" sz="1200" dirty="0" err="1"/>
+              <a:t>inout</a:t>
+            </a:r>
+            <a:r>
+              <a:rPr lang="fr-FR" sz="1200" dirty="0"/>
+              <a:t> _ b: T)</a:t>
+            </a:r>
+            <a:endParaRPr lang="en-US" sz="1200" dirty="0" smtClean="0"/>
+          </a:p>
+          <a:p>
+            <a:pPr lvl="2"/>
+            <a:r>
+              <a:rPr lang="en-US" sz="1400" dirty="0" smtClean="0"/>
+              <a:t>New data types( E.g. Dictionaries ) and Inferred Data types.</a:t>
+            </a:r>
+          </a:p>
+          <a:p>
+            <a:pPr lvl="2"/>
+            <a:r>
+              <a:rPr lang="en-US" sz="1400" dirty="0" smtClean="0"/>
+              <a:t>Protocols – Interfaces in Java</a:t>
+            </a:r>
+          </a:p>
+          <a:p>
+            <a:pPr lvl="2"/>
+            <a:r>
+              <a:rPr lang="en-US" sz="1400" dirty="0" smtClean="0"/>
+              <a:t>Closures – Like JavaScript</a:t>
+            </a:r>
+          </a:p>
+          <a:p>
+            <a:pPr lvl="2"/>
+            <a:r>
+              <a:rPr lang="en-US" sz="1400" dirty="0" smtClean="0"/>
+              <a:t>Anonymous functions – Like in C#/JavaScript</a:t>
+            </a:r>
+          </a:p>
+          <a:p>
+            <a:pPr lvl="2"/>
+            <a:r>
+              <a:rPr lang="en-US" sz="1400" dirty="0"/>
+              <a:t>Optional semicolon </a:t>
+            </a:r>
+            <a:r>
+              <a:rPr lang="en-US" sz="1400" dirty="0" smtClean="0"/>
+              <a:t>for easy code writing</a:t>
+            </a:r>
+          </a:p>
+          <a:p>
+            <a:pPr lvl="2"/>
+            <a:r>
+              <a:rPr lang="en-US" sz="1400" dirty="0" smtClean="0"/>
+              <a:t>Advance Memory Management(ARC) and Error handling(throw, catch)</a:t>
+            </a:r>
+          </a:p>
+          <a:p>
+            <a:pPr lvl="2"/>
+            <a:endParaRPr lang="en-US" sz="1400" dirty="0"/>
+          </a:p>
+          <a:p>
+            <a:pPr lvl="2"/>
+            <a:endParaRPr lang="en-US" dirty="0" smtClean="0"/>
+          </a:p>
+          <a:p>
+            <a:pPr lvl="2"/>
+            <a:endParaRPr lang="en-US" dirty="0" smtClean="0"/>
+          </a:p>
+          <a:p>
+            <a:pPr lvl="2"/>
+            <a:endParaRPr lang="en-US" dirty="0" smtClean="0"/>
+          </a:p>
+          <a:p>
+            <a:pPr lvl="2"/>
+            <a:endParaRPr lang="en-US" dirty="0" smtClean="0"/>
+          </a:p>
+          <a:p>
+            <a:pPr lvl="2"/>
+            <a:endParaRPr lang="en-US" dirty="0" smtClean="0"/>
+          </a:p>
+          <a:p>
+            <a:pPr lvl="2"/>
+            <a:endParaRPr lang="en-US" dirty="0" smtClean="0"/>
+          </a:p>
+          <a:p>
+            <a:pPr lvl="2"/>
+            <a:endParaRPr lang="en-US" dirty="0" smtClean="0"/>
+          </a:p>
+        </p:txBody>
+      </p:sp>
+    </p:spTree>
+    <p:extLst>
+      <p:ext uri="{BB962C8B-B14F-4D97-AF65-F5344CB8AC3E}">
+        <p14:creationId xmlns:p14="http://schemas.microsoft.com/office/powerpoint/2010/main" val="1322220211"/>
+      </p:ext>
+    </p:extLst>
+  </p:cSld>
+  <p:clrMapOvr>
+    <a:masterClrMapping/>
+  </p:clrMapOvr>
+</p:sld>
+</file>
+
+<file path=ppt/slides/slide6.xml><?xml version="1.0" encoding="utf-8"?>
+<p:sld xmlns:a="http://schemas.openxmlformats.org/drawingml/2006/main" xmlns:r="http://schemas.openxmlformats.org/officeDocument/2006/relationships" xmlns:p="http://schemas.openxmlformats.org/presentationml/2006/main">
+  <p:cSld>
+    <p:spTree>
+      <p:nvGrpSpPr>
+        <p:cNvPr id="1" name=""/>
+        <p:cNvGrpSpPr/>
+        <p:nvPr/>
+      </p:nvGrpSpPr>
+      <p:grpSpPr>
+        <a:xfrm>
+          <a:off x="0" y="0"/>
+          <a:ext cx="0" cy="0"/>
+          <a:chOff x="0" y="0"/>
+          <a:chExt cx="0" cy="0"/>
+        </a:xfrm>
+      </p:grpSpPr>
+      <p:sp>
+        <p:nvSpPr>
+          <p:cNvPr id="2" name="Title 1"/>
+          <p:cNvSpPr>
+            <a:spLocks noGrp="1"/>
+          </p:cNvSpPr>
+          <p:nvPr>
+            <p:ph type="title"/>
+          </p:nvPr>
+        </p:nvSpPr>
+        <p:spPr/>
+        <p:txBody>
+          <a:bodyPr/>
+          <a:lstStyle/>
+          <a:p>
+            <a:r>
+              <a:rPr lang="en-US" dirty="0" smtClean="0"/>
+              <a:t>Swift vs. </a:t>
+            </a:r>
+            <a:r>
+              <a:rPr lang="en-US" dirty="0" smtClean="0"/>
+              <a:t>Objective-C</a:t>
+            </a:r>
+            <a:endParaRPr lang="en-US" dirty="0"/>
+          </a:p>
+        </p:txBody>
+      </p:sp>
+      <p:sp>
+        <p:nvSpPr>
+          <p:cNvPr id="3" name="Content Placeholder 2"/>
+          <p:cNvSpPr>
+            <a:spLocks noGrp="1"/>
+          </p:cNvSpPr>
+          <p:nvPr>
+            <p:ph idx="1"/>
+          </p:nvPr>
+        </p:nvSpPr>
+        <p:spPr>
+          <a:xfrm>
+            <a:off x="781050" y="1314450"/>
+            <a:ext cx="9268803" cy="4933949"/>
+          </a:xfrm>
+        </p:spPr>
+        <p:txBody>
+          <a:bodyPr>
+            <a:normAutofit/>
+          </a:bodyPr>
+          <a:lstStyle/>
+          <a:p>
+            <a:pPr lvl="1"/>
+            <a:endParaRPr lang="en-US" dirty="0" smtClean="0"/>
+          </a:p>
+        </p:txBody>
+      </p:sp>
+    </p:spTree>
+    <p:extLst>
+      <p:ext uri="{BB962C8B-B14F-4D97-AF65-F5344CB8AC3E}">
+        <p14:creationId xmlns:p14="http://schemas.microsoft.com/office/powerpoint/2010/main" val="2145981111"/>
+      </p:ext>
+    </p:extLst>
+  </p:cSld>
+  <p:clrMapOvr>
+    <a:masterClrMapping/>
+  </p:clrMapOvr>
+</p:sld>
+</file>
+
 <file path=ppt/theme/theme1.xml><?xml version="1.0" encoding="utf-8"?>
 <a:theme xmlns:a="http://schemas.openxmlformats.org/drawingml/2006/main" name="Ion">
   <a:themeElements>

</xml_diff>

<commit_message>
Fixed the I/O explanation
</commit_message>
<xml_diff>
--- a/SwiftPresentation.pptx
+++ b/SwiftPresentation.pptx
@@ -6926,7 +6926,7 @@
             <a:pPr lvl="2"/>
             <a:r>
               <a:rPr lang="en-US" sz="1800" dirty="0" smtClean="0"/>
-              <a:t>Provides comprehensive File and Socket I/O through Foundation library.</a:t>
+              <a:t>Provides comprehensive File and Socket I/O through predefined set of classes/APIs.</a:t>
             </a:r>
           </a:p>
           <a:p>
@@ -6973,8 +6973,25 @@
             </a:r>
             <a:r>
               <a:rPr lang="en-US" sz="1800" dirty="0" smtClean="0"/>
-              <a:t> etc.</a:t>
-            </a:r>
+              <a:t> </a:t>
+            </a:r>
+            <a:r>
+              <a:rPr lang="en-US" sz="1800" dirty="0" err="1" smtClean="0"/>
+              <a:t>etc</a:t>
+            </a:r>
+            <a:r>
+              <a:rPr lang="en-US" sz="1800" dirty="0"/>
+              <a:t> </a:t>
+            </a:r>
+            <a:r>
+              <a:rPr lang="en-US" sz="1800" dirty="0" smtClean="0"/>
+              <a:t>from </a:t>
+            </a:r>
+            <a:r>
+              <a:rPr lang="en-US" sz="1800" smtClean="0"/>
+              <a:t>Foundation library.</a:t>
+            </a:r>
+            <a:endParaRPr lang="en-US" sz="1800" dirty="0" smtClean="0"/>
           </a:p>
           <a:p>
             <a:pPr lvl="3"/>

</xml_diff>